<commit_message>
Changed RGC presentation added wrap up slide
</commit_message>
<xml_diff>
--- a/tg1pres/rgc-naas-techgroup-cambs-14.pptx
+++ b/tg1pres/rgc-naas-techgroup-cambs-14.pptx
@@ -6,8 +6,8 @@
     <p:sldMasterId id="2147483660" r:id="rId2"/>
   </p:sldMasterIdLst>
   <p:sldIdLst>
-    <p:sldId id="256" r:id="rId3"/>
-    <p:sldId id="277" r:id="rId4"/>
+    <p:sldId id="283" r:id="rId3"/>
+    <p:sldId id="282" r:id="rId4"/>
     <p:sldId id="259" r:id="rId5"/>
     <p:sldId id="278" r:id="rId6"/>
     <p:sldId id="268" r:id="rId7"/>
@@ -7392,7 +7392,7 @@
           <a:lstStyle/>
           <a:p>
             <a:r>
-              <a:rPr lang="en-GB" sz="4800" b="1" dirty="0" err="1" smtClean="0">
+              <a:rPr lang="en-GB" sz="4800" b="1" dirty="0" err="1">
                 <a:solidFill>
                   <a:prstClr val="black"/>
                 </a:solidFill>
@@ -7402,17 +7402,27 @@
               <a:t>NaaS</a:t>
             </a:r>
             <a:r>
-              <a:rPr lang="en-GB" sz="4800" b="1" dirty="0" smtClean="0">
+              <a:rPr lang="en-GB" sz="4800" b="1">
                 <a:solidFill>
                   <a:prstClr val="black"/>
                 </a:solidFill>
                 <a:latin typeface="Corbel"/>
                 <a:ea typeface="ＭＳ Ｐゴシック" pitchFamily="-65" charset="-128"/>
               </a:rPr>
-              <a:t> box</a:t>
+              <a:t> </a:t>
+            </a:r>
+            <a:r>
+              <a:rPr lang="en-GB" sz="4800" b="1" smtClean="0">
+                <a:solidFill>
+                  <a:prstClr val="black"/>
+                </a:solidFill>
+                <a:latin typeface="Corbel"/>
+                <a:ea typeface="ＭＳ Ｐゴシック" pitchFamily="-65" charset="-128"/>
+              </a:rPr>
+              <a:t>box:</a:t>
             </a:r>
             <a:br>
-              <a:rPr lang="en-GB" sz="4800" b="1" dirty="0" smtClean="0">
+              <a:rPr lang="en-GB" sz="4800" b="1" smtClean="0">
                 <a:solidFill>
                   <a:prstClr val="black"/>
                 </a:solidFill>
@@ -7421,7 +7431,7 @@
               </a:rPr>
             </a:br>
             <a:r>
-              <a:rPr lang="en-GB" sz="4800" b="1" dirty="0" smtClean="0">
+              <a:rPr lang="en-GB" sz="4800" b="1" smtClean="0">
                 <a:solidFill>
                   <a:prstClr val="black"/>
                 </a:solidFill>
@@ -7431,7 +7441,7 @@
               <a:t>application </a:t>
             </a:r>
             <a:r>
-              <a:rPr lang="en-GB" sz="4800" b="1" dirty="0" smtClean="0">
+              <a:rPr lang="en-GB" sz="4800" b="1" dirty="0">
                 <a:solidFill>
                   <a:prstClr val="black"/>
                 </a:solidFill>
@@ -7441,7 +7451,7 @@
               <a:t>specific </a:t>
             </a:r>
             <a:r>
-              <a:rPr lang="en-GB" sz="4800" b="1" dirty="0" err="1" smtClean="0">
+              <a:rPr lang="en-GB" sz="4800" b="1" dirty="0" err="1">
                 <a:solidFill>
                   <a:prstClr val="black"/>
                 </a:solidFill>
@@ -7464,28 +7474,48 @@
             <p:ph type="subTitle" idx="1"/>
           </p:nvPr>
         </p:nvSpPr>
-        <p:spPr/>
+        <p:spPr>
+          <a:xfrm>
+            <a:off x="467544" y="4216820"/>
+            <a:ext cx="6400800" cy="1752600"/>
+          </a:xfrm>
+        </p:spPr>
         <p:txBody>
           <a:bodyPr/>
           <a:lstStyle/>
           <a:p>
-            <a:r>
-              <a:rPr lang="en-GB" dirty="0" smtClean="0"/>
+            <a:pPr>
+              <a:spcBef>
+                <a:spcPts val="1200"/>
+              </a:spcBef>
+            </a:pPr>
+            <a:r>
+              <a:rPr lang="en-GB" sz="2000" dirty="0" smtClean="0"/>
               <a:t>University of Cambridge</a:t>
             </a:r>
           </a:p>
           <a:p>
-            <a:r>
-              <a:rPr lang="en-GB" dirty="0" smtClean="0"/>
+            <a:pPr>
+              <a:spcBef>
+                <a:spcPts val="1200"/>
+              </a:spcBef>
+            </a:pPr>
+            <a:r>
+              <a:rPr lang="en-GB" sz="2000" dirty="0" smtClean="0"/>
               <a:t>Imperial College London</a:t>
             </a:r>
           </a:p>
           <a:p>
-            <a:r>
-              <a:rPr lang="en-GB" dirty="0" smtClean="0"/>
+            <a:pPr>
+              <a:spcBef>
+                <a:spcPts val="1200"/>
+              </a:spcBef>
+            </a:pPr>
+            <a:r>
+              <a:rPr lang="en-GB" sz="2000" dirty="0" smtClean="0"/>
               <a:t>University of Nottingham</a:t>
             </a:r>
-            <a:endParaRPr lang="en-GB" dirty="0"/>
+            <a:endParaRPr lang="en-GB" sz="2000" dirty="0"/>
           </a:p>
         </p:txBody>
       </p:sp>
@@ -7512,7 +7542,7 @@
         </p:blipFill>
         <p:spPr bwMode="auto">
           <a:xfrm>
-            <a:off x="1835696" y="863809"/>
+            <a:off x="1478559" y="327800"/>
             <a:ext cx="1278716" cy="1428009"/>
           </a:xfrm>
           <a:prstGeom prst="rect">
@@ -7553,7 +7583,7 @@
         </p:blipFill>
         <p:spPr bwMode="auto">
           <a:xfrm>
-            <a:off x="6995508" y="4005064"/>
+            <a:off x="5959844" y="4176889"/>
             <a:ext cx="1828800" cy="438150"/>
           </a:xfrm>
           <a:prstGeom prst="rect">
@@ -7607,7 +7637,7 @@
         </p:blipFill>
         <p:spPr bwMode="auto">
           <a:xfrm>
-            <a:off x="7043171" y="4509120"/>
+            <a:off x="6007507" y="4680945"/>
             <a:ext cx="1600200" cy="419100"/>
           </a:xfrm>
           <a:prstGeom prst="rect">
@@ -7660,7 +7690,7 @@
         </p:blipFill>
         <p:spPr>
           <a:xfrm>
-            <a:off x="6998402" y="5085184"/>
+            <a:off x="5962738" y="5257009"/>
             <a:ext cx="1456179" cy="455056"/>
           </a:xfrm>
           <a:prstGeom prst="rect">
@@ -7676,7 +7706,7 @@
         </p:nvGrpSpPr>
         <p:grpSpPr>
           <a:xfrm>
-            <a:off x="4570759" y="918449"/>
+            <a:off x="4213622" y="382440"/>
             <a:ext cx="3457537" cy="1323198"/>
             <a:chOff x="2244653" y="1304800"/>
             <a:chExt cx="5121978" cy="2250250"/>
@@ -11632,16 +11662,118 @@
           </p:style>
         </p:cxnSp>
       </p:grpSp>
+      <p:sp>
+        <p:nvSpPr>
+          <p:cNvPr id="4" name="TextBox 3"/>
+          <p:cNvSpPr txBox="1"/>
+          <p:nvPr/>
+        </p:nvSpPr>
+        <p:spPr>
+          <a:xfrm>
+            <a:off x="0" y="6535036"/>
+            <a:ext cx="9144000" cy="276999"/>
+          </a:xfrm>
+          <a:prstGeom prst="rect">
+            <a:avLst/>
+          </a:prstGeom>
+          <a:noFill/>
+        </p:spPr>
+        <p:txBody>
+          <a:bodyPr wrap="square" rtlCol="0">
+            <a:spAutoFit/>
+          </a:bodyPr>
+          <a:lstStyle/>
+          <a:p>
+            <a:pPr algn="ctr"/>
+            <a:r>
+              <a:rPr lang="en-GB" sz="1200" dirty="0" smtClean="0">
+                <a:solidFill>
+                  <a:schemeClr val="tx1"/>
+                </a:solidFill>
+              </a:rPr>
+              <a:t>Funded by the UK Engineering and Physical Sciences Research Council (EPSRC)</a:t>
+            </a:r>
+            <a:endParaRPr lang="en-GB" sz="1200" dirty="0">
+              <a:solidFill>
+                <a:schemeClr val="tx1"/>
+              </a:solidFill>
+            </a:endParaRPr>
+          </a:p>
+        </p:txBody>
+      </p:sp>
+      <p:sp>
+        <p:nvSpPr>
+          <p:cNvPr id="5" name="TextBox 4"/>
+          <p:cNvSpPr txBox="1"/>
+          <p:nvPr/>
+        </p:nvSpPr>
+        <p:spPr>
+          <a:xfrm>
+            <a:off x="0" y="5991336"/>
+            <a:ext cx="9144000" cy="338554"/>
+          </a:xfrm>
+          <a:prstGeom prst="rect">
+            <a:avLst/>
+          </a:prstGeom>
+          <a:noFill/>
+        </p:spPr>
+        <p:txBody>
+          <a:bodyPr wrap="square" rtlCol="0">
+            <a:spAutoFit/>
+          </a:bodyPr>
+          <a:lstStyle/>
+          <a:p>
+            <a:pPr algn="ctr"/>
+            <a:r>
+              <a:rPr lang="en-GB" sz="1600" dirty="0" smtClean="0">
+                <a:solidFill>
+                  <a:schemeClr val="tx1"/>
+                </a:solidFill>
+              </a:rPr>
+              <a:t>Richard Clegg, </a:t>
+            </a:r>
+            <a:r>
+              <a:rPr lang="en-GB" sz="1600" dirty="0" smtClean="0">
+                <a:solidFill>
+                  <a:schemeClr val="tx1"/>
+                </a:solidFill>
+              </a:rPr>
+              <a:t>Imperial College London </a:t>
+            </a:r>
+            <a:r>
+              <a:rPr lang="en-GB" sz="1600" dirty="0" smtClean="0">
+                <a:solidFill>
+                  <a:schemeClr val="tx1"/>
+                </a:solidFill>
+              </a:rPr>
+              <a:t>&lt;richard@richardclegg.org&gt;</a:t>
+            </a:r>
+            <a:endParaRPr lang="en-GB" sz="1600" dirty="0">
+              <a:solidFill>
+                <a:schemeClr val="tx1"/>
+              </a:solidFill>
+            </a:endParaRPr>
+          </a:p>
+        </p:txBody>
+      </p:sp>
     </p:spTree>
     <p:extLst>
       <p:ext uri="{BB962C8B-B14F-4D97-AF65-F5344CB8AC3E}">
-        <p14:creationId xmlns:p14="http://schemas.microsoft.com/office/powerpoint/2010/main" val="3350760435"/>
+        <p14:creationId xmlns:p14="http://schemas.microsoft.com/office/powerpoint/2010/main" val="1521970843"/>
       </p:ext>
     </p:extLst>
   </p:cSld>
   <p:clrMapOvr>
     <a:masterClrMapping/>
   </p:clrMapOvr>
+  <mc:AlternateContent xmlns:mc="http://schemas.openxmlformats.org/markup-compatibility/2006" xmlns:p14="http://schemas.microsoft.com/office/powerpoint/2010/main">
+    <mc:Choice Requires="p14">
+      <p:transition spd="slow" p14:dur="2000"/>
+    </mc:Choice>
+    <mc:Fallback xmlns="">
+      <p:transition spd="slow"/>
+    </mc:Fallback>
+  </mc:AlternateContent>
   <p:timing>
     <p:tnLst>
       <p:par>
@@ -11687,11 +11819,7 @@
             <a:pPr algn="ctr"/>
             <a:r>
               <a:rPr lang="en-GB" dirty="0" smtClean="0"/>
-              <a:t>Core concepts: Dispatching and </a:t>
-            </a:r>
-            <a:r>
-              <a:rPr lang="en-GB" dirty="0" smtClean="0"/>
-              <a:t>scheduling</a:t>
+              <a:t>Core concepts: Dispatching and scheduling</a:t>
             </a:r>
             <a:endParaRPr lang="en-GB" dirty="0"/>
           </a:p>
@@ -17780,23 +17908,8 @@
           <a:p>
             <a:pPr algn="ctr"/>
             <a:r>
-              <a:rPr lang="en-GB" dirty="0" err="1" smtClean="0"/>
-              <a:t>NaaS</a:t>
-            </a:r>
-            <a:r>
               <a:rPr lang="en-GB" dirty="0" smtClean="0"/>
-              <a:t> box:</a:t>
-            </a:r>
-            <a:br>
-              <a:rPr lang="en-GB" dirty="0" smtClean="0"/>
-            </a:br>
-            <a:r>
-              <a:rPr lang="en-GB" dirty="0" smtClean="0"/>
-              <a:t>application specific </a:t>
-            </a:r>
-            <a:r>
-              <a:rPr lang="en-GB" dirty="0" err="1" smtClean="0"/>
-              <a:t>middlebox</a:t>
+              <a:t>Challenges for NaaS</a:t>
             </a:r>
             <a:endParaRPr lang="en-GB" dirty="0"/>
           </a:p>
@@ -17814,7 +17927,7 @@
         </p:nvSpPr>
         <p:spPr>
           <a:xfrm>
-            <a:off x="467544" y="2996952"/>
+            <a:off x="467544" y="3179232"/>
             <a:ext cx="8229600" cy="3419872"/>
           </a:xfrm>
         </p:spPr>
@@ -17823,8 +17936,28 @@
           <a:lstStyle/>
           <a:p>
             <a:r>
-              <a:rPr lang="en-GB" sz="2400" dirty="0" smtClean="0"/>
-              <a:t>Performance:</a:t>
+              <a:rPr lang="en-GB" sz="2000" dirty="0" smtClean="0"/>
+              <a:t>1. </a:t>
+            </a:r>
+            <a:r>
+              <a:rPr lang="en-GB" sz="2000" dirty="0" smtClean="0">
+                <a:solidFill>
+                  <a:srgbClr val="FF8000"/>
+                </a:solidFill>
+              </a:rPr>
+              <a:t>Performance</a:t>
+            </a:r>
+            <a:r>
+              <a:rPr lang="en-GB" sz="2000" dirty="0" smtClean="0"/>
+              <a:t> &amp; </a:t>
+            </a:r>
+            <a:r>
+              <a:rPr lang="en-GB" sz="2000" dirty="0" smtClean="0">
+                <a:solidFill>
+                  <a:srgbClr val="FF8000"/>
+                </a:solidFill>
+              </a:rPr>
+              <a:t>efficiency</a:t>
             </a:r>
           </a:p>
           <a:p>
@@ -17835,11 +17968,15 @@
                   <a:srgbClr val="FF0000"/>
                 </a:solidFill>
               </a:rPr>
-              <a:t>Line rate data processing (10G initially)</a:t>
-            </a:r>
-          </a:p>
-          <a:p>
-            <a:pPr lvl="1"/>
+              <a:t>Line rate data processing (10Gbps initially)</a:t>
+            </a:r>
+          </a:p>
+          <a:p>
+            <a:pPr lvl="1">
+              <a:spcBef>
+                <a:spcPts val="0"/>
+              </a:spcBef>
+            </a:pPr>
             <a:r>
               <a:rPr lang="en-GB" sz="2000" dirty="0" smtClean="0">
                 <a:solidFill>
@@ -17850,16 +17987,40 @@
             </a:r>
           </a:p>
           <a:p>
-            <a:pPr lvl="1"/>
+            <a:pPr lvl="1">
+              <a:spcBef>
+                <a:spcPts val="0"/>
+              </a:spcBef>
+            </a:pPr>
             <a:r>
               <a:rPr lang="en-GB" sz="2000" dirty="0" smtClean="0"/>
-              <a:t>Offload to hardware</a:t>
-            </a:r>
-          </a:p>
-          <a:p>
-            <a:r>
-              <a:rPr lang="en-GB" sz="2400" dirty="0" smtClean="0"/>
-              <a:t>Flexibility:</a:t>
+              <a:t>Offload to hardware when possible</a:t>
+            </a:r>
+          </a:p>
+          <a:p>
+            <a:r>
+              <a:rPr lang="en-GB" sz="2000" dirty="0" smtClean="0"/>
+              <a:t>2. </a:t>
+            </a:r>
+            <a:r>
+              <a:rPr lang="en-GB" sz="2000" dirty="0" smtClean="0">
+                <a:solidFill>
+                  <a:srgbClr val="FF8000"/>
+                </a:solidFill>
+              </a:rPr>
+              <a:t>Programmability</a:t>
+            </a:r>
+            <a:r>
+              <a:rPr lang="en-GB" sz="2000" dirty="0" smtClean="0"/>
+              <a:t> &amp; </a:t>
+            </a:r>
+            <a:r>
+              <a:rPr lang="en-GB" sz="2000" dirty="0" smtClean="0">
+                <a:solidFill>
+                  <a:srgbClr val="FF8000"/>
+                </a:solidFill>
+              </a:rPr>
+              <a:t>flexibility</a:t>
             </a:r>
           </a:p>
           <a:p>
@@ -17870,11 +18031,15 @@
                   <a:srgbClr val="FF0000"/>
                 </a:solidFill>
               </a:rPr>
-              <a:t>Very rapid development for new applications</a:t>
-            </a:r>
-          </a:p>
-          <a:p>
-            <a:pPr lvl="1"/>
+              <a:t>Rapid development of new network services</a:t>
+            </a:r>
+          </a:p>
+          <a:p>
+            <a:pPr lvl="1">
+              <a:spcBef>
+                <a:spcPts val="0"/>
+              </a:spcBef>
+            </a:pPr>
             <a:r>
               <a:rPr lang="en-GB" sz="2000" dirty="0" smtClean="0"/>
               <a:t>Simple deployment, resource placement and </a:t>
@@ -17885,13 +18050,33 @@
                   <a:srgbClr val="FF0000"/>
                 </a:solidFill>
               </a:rPr>
-              <a:t>resource allocation</a:t>
-            </a:r>
-          </a:p>
-          <a:p>
-            <a:r>
-              <a:rPr lang="en-GB" sz="2400" dirty="0" smtClean="0"/>
-              <a:t>Security:</a:t>
+              <a:t>allocation</a:t>
+            </a:r>
+          </a:p>
+          <a:p>
+            <a:r>
+              <a:rPr lang="en-GB" sz="2000" dirty="0" smtClean="0"/>
+              <a:t>3. </a:t>
+            </a:r>
+            <a:r>
+              <a:rPr lang="en-GB" sz="2000" dirty="0" smtClean="0">
+                <a:solidFill>
+                  <a:srgbClr val="FF8000"/>
+                </a:solidFill>
+              </a:rPr>
+              <a:t>Security</a:t>
+            </a:r>
+            <a:r>
+              <a:rPr lang="en-GB" sz="2000" dirty="0" smtClean="0"/>
+              <a:t> &amp; </a:t>
+            </a:r>
+            <a:r>
+              <a:rPr lang="en-GB" sz="2000" dirty="0" smtClean="0">
+                <a:solidFill>
+                  <a:srgbClr val="FF8000"/>
+                </a:solidFill>
+              </a:rPr>
+              <a:t>safety</a:t>
             </a:r>
           </a:p>
           <a:p>
@@ -17902,33 +18087,8 @@
                   <a:srgbClr val="FF0000"/>
                 </a:solidFill>
               </a:rPr>
-              <a:t>Isolation of applications within shared hardware</a:t>
-            </a:r>
-          </a:p>
-        </p:txBody>
-      </p:sp>
-      <p:sp>
-        <p:nvSpPr>
-          <p:cNvPr id="4" name="Slide Number Placeholder 3"/>
-          <p:cNvSpPr>
-            <a:spLocks noGrp="1"/>
-          </p:cNvSpPr>
-          <p:nvPr>
-            <p:ph type="sldNum" sz="quarter" idx="12"/>
-          </p:nvPr>
-        </p:nvSpPr>
-        <p:spPr/>
-        <p:txBody>
-          <a:bodyPr/>
-          <a:lstStyle/>
-          <a:p>
-            <a:pPr algn="r"/>
-            <a:fld id="{CEC7F6DD-A7B5-4428-B2E1-62679F5667CA}" type="slidenum">
-              <a:rPr lang="en-US" smtClean="0"/>
-              <a:pPr algn="r"/>
-              <a:t>2</a:t>
-            </a:fld>
-            <a:endParaRPr lang="en-US" dirty="0"/>
+              <a:t>Isolation of services within shared hardware</a:t>
+            </a:r>
           </a:p>
         </p:txBody>
       </p:sp>
@@ -17955,7 +18115,7 @@
         </p:blipFill>
         <p:spPr bwMode="auto">
           <a:xfrm>
-            <a:off x="1362738" y="1527907"/>
+            <a:off x="1374520" y="1397755"/>
             <a:ext cx="1278716" cy="1428009"/>
           </a:xfrm>
           <a:prstGeom prst="rect">
@@ -17981,7 +18141,7 @@
         </p:nvGrpSpPr>
         <p:grpSpPr>
           <a:xfrm>
-            <a:off x="4280196" y="1636434"/>
+            <a:off x="3364880" y="1504083"/>
             <a:ext cx="3457537" cy="1323198"/>
             <a:chOff x="2244653" y="1304800"/>
             <a:chExt cx="5121978" cy="2250250"/>
@@ -21940,17 +22100,239 @@
     </p:spTree>
     <p:extLst>
       <p:ext uri="{BB962C8B-B14F-4D97-AF65-F5344CB8AC3E}">
-        <p14:creationId xmlns:p14="http://schemas.microsoft.com/office/powerpoint/2010/main" val="751654958"/>
+        <p14:creationId xmlns:p14="http://schemas.microsoft.com/office/powerpoint/2010/main" val="3382275567"/>
       </p:ext>
     </p:extLst>
   </p:cSld>
   <p:clrMapOvr>
     <a:masterClrMapping/>
   </p:clrMapOvr>
+  <mc:AlternateContent xmlns:mc="http://schemas.openxmlformats.org/markup-compatibility/2006" xmlns:p14="http://schemas.microsoft.com/office/powerpoint/2010/main">
+    <mc:Choice Requires="p14">
+      <p:transition spd="slow" p14:dur="2000"/>
+    </mc:Choice>
+    <mc:Fallback xmlns="">
+      <p:transition spd="slow"/>
+    </mc:Fallback>
+  </mc:AlternateContent>
   <p:timing>
     <p:tnLst>
       <p:par>
-        <p:cTn id="1" dur="indefinite" restart="never" nodeType="tmRoot"/>
+        <p:cTn id="1" dur="indefinite" restart="never" nodeType="tmRoot">
+          <p:childTnLst>
+            <p:seq concurrent="1" nextAc="seek">
+              <p:cTn id="2" dur="indefinite" nodeType="mainSeq">
+                <p:childTnLst>
+                  <p:par>
+                    <p:cTn id="3" fill="hold">
+                      <p:stCondLst>
+                        <p:cond delay="indefinite"/>
+                      </p:stCondLst>
+                      <p:childTnLst>
+                        <p:par>
+                          <p:cTn id="4" fill="hold">
+                            <p:stCondLst>
+                              <p:cond delay="0"/>
+                            </p:stCondLst>
+                            <p:childTnLst>
+                              <p:par>
+                                <p:cTn id="5" presetID="1" presetClass="entr" presetSubtype="0" fill="hold" nodeType="clickEffect">
+                                  <p:stCondLst>
+                                    <p:cond delay="0"/>
+                                  </p:stCondLst>
+                                  <p:childTnLst>
+                                    <p:set>
+                                      <p:cBhvr>
+                                        <p:cTn id="6" dur="1" fill="hold">
+                                          <p:stCondLst>
+                                            <p:cond delay="0"/>
+                                          </p:stCondLst>
+                                        </p:cTn>
+                                        <p:tgtEl>
+                                          <p:spTgt spid="3">
+                                            <p:txEl>
+                                              <p:pRg st="4" end="4"/>
+                                            </p:txEl>
+                                          </p:spTgt>
+                                        </p:tgtEl>
+                                        <p:attrNameLst>
+                                          <p:attrName>style.visibility</p:attrName>
+                                        </p:attrNameLst>
+                                      </p:cBhvr>
+                                      <p:to>
+                                        <p:strVal val="visible"/>
+                                      </p:to>
+                                    </p:set>
+                                  </p:childTnLst>
+                                </p:cTn>
+                              </p:par>
+                              <p:par>
+                                <p:cTn id="7" presetID="1" presetClass="entr" presetSubtype="0" fill="hold" nodeType="withEffect">
+                                  <p:stCondLst>
+                                    <p:cond delay="0"/>
+                                  </p:stCondLst>
+                                  <p:childTnLst>
+                                    <p:set>
+                                      <p:cBhvr>
+                                        <p:cTn id="8" dur="1" fill="hold">
+                                          <p:stCondLst>
+                                            <p:cond delay="0"/>
+                                          </p:stCondLst>
+                                        </p:cTn>
+                                        <p:tgtEl>
+                                          <p:spTgt spid="3">
+                                            <p:txEl>
+                                              <p:pRg st="5" end="5"/>
+                                            </p:txEl>
+                                          </p:spTgt>
+                                        </p:tgtEl>
+                                        <p:attrNameLst>
+                                          <p:attrName>style.visibility</p:attrName>
+                                        </p:attrNameLst>
+                                      </p:cBhvr>
+                                      <p:to>
+                                        <p:strVal val="visible"/>
+                                      </p:to>
+                                    </p:set>
+                                  </p:childTnLst>
+                                </p:cTn>
+                              </p:par>
+                              <p:par>
+                                <p:cTn id="9" presetID="1" presetClass="entr" presetSubtype="0" fill="hold" nodeType="withEffect">
+                                  <p:stCondLst>
+                                    <p:cond delay="0"/>
+                                  </p:stCondLst>
+                                  <p:childTnLst>
+                                    <p:set>
+                                      <p:cBhvr>
+                                        <p:cTn id="10" dur="1" fill="hold">
+                                          <p:stCondLst>
+                                            <p:cond delay="0"/>
+                                          </p:stCondLst>
+                                        </p:cTn>
+                                        <p:tgtEl>
+                                          <p:spTgt spid="3">
+                                            <p:txEl>
+                                              <p:pRg st="6" end="6"/>
+                                            </p:txEl>
+                                          </p:spTgt>
+                                        </p:tgtEl>
+                                        <p:attrNameLst>
+                                          <p:attrName>style.visibility</p:attrName>
+                                        </p:attrNameLst>
+                                      </p:cBhvr>
+                                      <p:to>
+                                        <p:strVal val="visible"/>
+                                      </p:to>
+                                    </p:set>
+                                  </p:childTnLst>
+                                </p:cTn>
+                              </p:par>
+                            </p:childTnLst>
+                          </p:cTn>
+                        </p:par>
+                      </p:childTnLst>
+                    </p:cTn>
+                  </p:par>
+                  <p:par>
+                    <p:cTn id="11" fill="hold">
+                      <p:stCondLst>
+                        <p:cond delay="indefinite"/>
+                      </p:stCondLst>
+                      <p:childTnLst>
+                        <p:par>
+                          <p:cTn id="12" fill="hold">
+                            <p:stCondLst>
+                              <p:cond delay="0"/>
+                            </p:stCondLst>
+                            <p:childTnLst>
+                              <p:par>
+                                <p:cTn id="13" presetID="1" presetClass="entr" presetSubtype="0" fill="hold" nodeType="clickEffect">
+                                  <p:stCondLst>
+                                    <p:cond delay="0"/>
+                                  </p:stCondLst>
+                                  <p:childTnLst>
+                                    <p:set>
+                                      <p:cBhvr>
+                                        <p:cTn id="14" dur="1" fill="hold">
+                                          <p:stCondLst>
+                                            <p:cond delay="0"/>
+                                          </p:stCondLst>
+                                        </p:cTn>
+                                        <p:tgtEl>
+                                          <p:spTgt spid="3">
+                                            <p:txEl>
+                                              <p:pRg st="7" end="7"/>
+                                            </p:txEl>
+                                          </p:spTgt>
+                                        </p:tgtEl>
+                                        <p:attrNameLst>
+                                          <p:attrName>style.visibility</p:attrName>
+                                        </p:attrNameLst>
+                                      </p:cBhvr>
+                                      <p:to>
+                                        <p:strVal val="visible"/>
+                                      </p:to>
+                                    </p:set>
+                                  </p:childTnLst>
+                                </p:cTn>
+                              </p:par>
+                              <p:par>
+                                <p:cTn id="15" presetID="1" presetClass="entr" presetSubtype="0" fill="hold" nodeType="withEffect">
+                                  <p:stCondLst>
+                                    <p:cond delay="0"/>
+                                  </p:stCondLst>
+                                  <p:childTnLst>
+                                    <p:set>
+                                      <p:cBhvr>
+                                        <p:cTn id="16" dur="1" fill="hold">
+                                          <p:stCondLst>
+                                            <p:cond delay="0"/>
+                                          </p:stCondLst>
+                                        </p:cTn>
+                                        <p:tgtEl>
+                                          <p:spTgt spid="3">
+                                            <p:txEl>
+                                              <p:pRg st="8" end="8"/>
+                                            </p:txEl>
+                                          </p:spTgt>
+                                        </p:tgtEl>
+                                        <p:attrNameLst>
+                                          <p:attrName>style.visibility</p:attrName>
+                                        </p:attrNameLst>
+                                      </p:cBhvr>
+                                      <p:to>
+                                        <p:strVal val="visible"/>
+                                      </p:to>
+                                    </p:set>
+                                  </p:childTnLst>
+                                </p:cTn>
+                              </p:par>
+                            </p:childTnLst>
+                          </p:cTn>
+                        </p:par>
+                      </p:childTnLst>
+                    </p:cTn>
+                  </p:par>
+                </p:childTnLst>
+              </p:cTn>
+              <p:prevCondLst>
+                <p:cond evt="onPrev" delay="0">
+                  <p:tgtEl>
+                    <p:sldTgt/>
+                  </p:tgtEl>
+                </p:cond>
+              </p:prevCondLst>
+              <p:nextCondLst>
+                <p:cond evt="onNext" delay="0">
+                  <p:tgtEl>
+                    <p:sldTgt/>
+                  </p:tgtEl>
+                </p:cond>
+              </p:nextCondLst>
+            </p:seq>
+          </p:childTnLst>
+        </p:cTn>
       </p:par>
     </p:tnLst>
   </p:timing>
@@ -28044,7 +28426,6 @@
               <a:rPr lang="en-GB" sz="2800" dirty="0" smtClean="0"/>
               <a:t> tasks</a:t>
             </a:r>
-            <a:endParaRPr lang="en-GB" sz="2800" dirty="0" smtClean="0"/>
           </a:p>
           <a:p>
             <a:r>
@@ -28057,11 +28438,7 @@
             </a:r>
             <a:r>
               <a:rPr lang="en-GB" sz="2800" dirty="0" smtClean="0"/>
-              <a:t>uring complete – express only transforms that will </a:t>
-            </a:r>
-            <a:r>
-              <a:rPr lang="en-GB" sz="2800" dirty="0" smtClean="0"/>
-              <a:t>run at line rate</a:t>
+              <a:t>uring complete – express only transforms that will run at line rate</a:t>
             </a:r>
           </a:p>
         </p:txBody>
@@ -28365,11 +28742,7 @@
             </a:r>
             <a:r>
               <a:rPr lang="en-GB" dirty="0" smtClean="0"/>
-              <a:t> </a:t>
-            </a:r>
-            <a:r>
-              <a:rPr lang="en-GB" dirty="0" smtClean="0"/>
-              <a:t>example</a:t>
+              <a:t> example</a:t>
             </a:r>
             <a:endParaRPr lang="en-GB" dirty="0"/>
           </a:p>
@@ -30976,15 +31349,7 @@
             <a:pPr algn="ctr"/>
             <a:r>
               <a:rPr lang="en-GB" sz="4400" dirty="0" smtClean="0"/>
-              <a:t>Task graph: </a:t>
-            </a:r>
-            <a:r>
-              <a:rPr lang="en-GB" sz="4400" dirty="0" smtClean="0"/>
-              <a:t>Web </a:t>
-            </a:r>
-            <a:r>
-              <a:rPr lang="en-GB" sz="4400" dirty="0" smtClean="0"/>
-              <a:t>proxy example</a:t>
+              <a:t>Task graph: Web proxy example</a:t>
             </a:r>
             <a:endParaRPr lang="en-GB" sz="4400" dirty="0"/>
           </a:p>

</xml_diff>